<commit_message>
Slide added to README!
</commit_message>
<xml_diff>
--- a/Final Presentation/FYPFinalPresentation.pptx
+++ b/Final Presentation/FYPFinalPresentation.pptx
@@ -200,7 +200,7 @@
           <a:p>
             <a:fld id="{55FF297E-CA1A-4BC9-A73D-BCACC3A6DC22}" type="datetimeFigureOut">
               <a:rPr lang="en-GB" smtClean="0"/>
-              <a:t>25/04/2018</a:t>
+              <a:t>26/04/2018</a:t>
             </a:fld>
             <a:endParaRPr lang="en-GB"/>
           </a:p>
@@ -1158,7 +1158,7 @@
             <a:fld id="{D200B3F0-A9BC-48CE-8EB6-ECE965069900}" type="datetimeFigureOut">
               <a:rPr lang="en-US" dirty="0"/>
               <a:pPr/>
-              <a:t>4/25/2018</a:t>
+              <a:t>4/26/2018</a:t>
             </a:fld>
             <a:endParaRPr lang="en-US" dirty="0"/>
           </a:p>
@@ -2319,7 +2319,7 @@
           <a:p>
             <a:fld id="{3DF9FFFF-3106-4DDB-AA62-0C80862170D6}" type="datetimeFigureOut">
               <a:rPr lang="en-US" dirty="0"/>
-              <a:t>4/25/2018</a:t>
+              <a:t>4/26/2018</a:t>
             </a:fld>
             <a:endParaRPr lang="en-US" dirty="0"/>
           </a:p>
@@ -3373,7 +3373,7 @@
           <a:p>
             <a:fld id="{A3DA38B7-AE95-4DC8-9A51-7A71F545B098}" type="datetimeFigureOut">
               <a:rPr lang="en-US" dirty="0"/>
-              <a:t>4/25/2018</a:t>
+              <a:t>4/26/2018</a:t>
             </a:fld>
             <a:endParaRPr lang="en-US" dirty="0"/>
           </a:p>
@@ -4586,7 +4586,7 @@
           <a:p>
             <a:fld id="{86F1EC2B-8188-4AC2-9F0D-8D09C51D505A}" type="datetimeFigureOut">
               <a:rPr lang="en-US" dirty="0"/>
-              <a:t>4/25/2018</a:t>
+              <a:t>4/26/2018</a:t>
             </a:fld>
             <a:endParaRPr lang="en-US" dirty="0"/>
           </a:p>
@@ -5690,7 +5690,7 @@
           <a:p>
             <a:fld id="{9212B75E-944F-430B-BE5F-C69FA8823C04}" type="datetimeFigureOut">
               <a:rPr lang="en-US" dirty="0"/>
-              <a:t>4/25/2018</a:t>
+              <a:t>4/26/2018</a:t>
             </a:fld>
             <a:endParaRPr lang="en-US" dirty="0"/>
           </a:p>
@@ -6342,7 +6342,7 @@
           <a:p>
             <a:fld id="{79AE0DC7-7F53-471C-A711-B3DA6F2535F3}" type="datetimeFigureOut">
               <a:rPr lang="en-US" dirty="0"/>
-              <a:t>4/25/2018</a:t>
+              <a:t>4/26/2018</a:t>
             </a:fld>
             <a:endParaRPr lang="en-US" dirty="0"/>
           </a:p>
@@ -7189,7 +7189,7 @@
           <a:p>
             <a:fld id="{3C1F4C9D-4618-451D-80C1-6A376BB42AB4}" type="datetimeFigureOut">
               <a:rPr lang="en-US" dirty="0"/>
-              <a:t>4/25/2018</a:t>
+              <a:t>4/26/2018</a:t>
             </a:fld>
             <a:endParaRPr lang="en-US" dirty="0"/>
           </a:p>
@@ -7374,7 +7374,7 @@
           <a:p>
             <a:fld id="{F54D2318-CE40-42F6-962A-4C6D6CF697DB}" type="datetimeFigureOut">
               <a:rPr lang="en-US" dirty="0"/>
-              <a:t>4/25/2018</a:t>
+              <a:t>4/26/2018</a:t>
             </a:fld>
             <a:endParaRPr lang="en-US" dirty="0"/>
           </a:p>
@@ -8415,7 +8415,7 @@
           <a:p>
             <a:fld id="{0C476AC1-EB7F-4BEF-90D9-5764B50DAF8A}" type="datetimeFigureOut">
               <a:rPr lang="en-US" dirty="0"/>
-              <a:t>4/25/2018</a:t>
+              <a:t>4/26/2018</a:t>
             </a:fld>
             <a:endParaRPr lang="en-US" dirty="0"/>
           </a:p>
@@ -8631,7 +8631,7 @@
           <a:p>
             <a:fld id="{1B20712A-F861-4AB0-A754-4F5A2033CD4B}" type="datetimeFigureOut">
               <a:rPr lang="en-US" dirty="0"/>
-              <a:t>4/25/2018</a:t>
+              <a:t>4/26/2018</a:t>
             </a:fld>
             <a:endParaRPr lang="en-US" dirty="0"/>
           </a:p>
@@ -9736,7 +9736,7 @@
           <a:p>
             <a:fld id="{324507B7-F2DC-4B2C-B14D-58A9766807A2}" type="datetimeFigureOut">
               <a:rPr lang="en-US" dirty="0"/>
-              <a:t>4/25/2018</a:t>
+              <a:t>4/26/2018</a:t>
             </a:fld>
             <a:endParaRPr lang="en-US" dirty="0"/>
           </a:p>
@@ -10008,7 +10008,7 @@
           <a:p>
             <a:fld id="{904A483D-5CB4-4842-8F2F-05D5276ACF63}" type="datetimeFigureOut">
               <a:rPr lang="en-US" dirty="0"/>
-              <a:t>4/25/2018</a:t>
+              <a:t>4/26/2018</a:t>
             </a:fld>
             <a:endParaRPr lang="en-US" dirty="0"/>
           </a:p>
@@ -10390,7 +10390,7 @@
           <a:p>
             <a:fld id="{1D1CE32E-9DC0-47C8-A657-48F5C3E4A10B}" type="datetimeFigureOut">
               <a:rPr lang="en-US" dirty="0"/>
-              <a:t>4/25/2018</a:t>
+              <a:t>4/26/2018</a:t>
             </a:fld>
             <a:endParaRPr lang="en-US" dirty="0"/>
           </a:p>
@@ -10508,7 +10508,7 @@
           <a:p>
             <a:fld id="{2BDF5C0D-8C3A-4771-A43D-83937FC700D4}" type="datetimeFigureOut">
               <a:rPr lang="en-US" dirty="0"/>
-              <a:t>4/25/2018</a:t>
+              <a:t>4/26/2018</a:t>
             </a:fld>
             <a:endParaRPr lang="en-US" dirty="0"/>
           </a:p>
@@ -10603,7 +10603,7 @@
           <a:p>
             <a:fld id="{0203D2D6-FCC2-425A-A4A7-8058E8C01CB1}" type="datetimeFigureOut">
               <a:rPr lang="en-US" dirty="0"/>
-              <a:t>4/25/2018</a:t>
+              <a:t>4/26/2018</a:t>
             </a:fld>
             <a:endParaRPr lang="en-US" dirty="0"/>
           </a:p>
@@ -11755,7 +11755,7 @@
           <a:p>
             <a:fld id="{D8CF2683-E6E7-4CC3-9EEE-7854DD4F3545}" type="datetimeFigureOut">
               <a:rPr lang="en-US" dirty="0"/>
-              <a:t>4/25/2018</a:t>
+              <a:t>4/26/2018</a:t>
             </a:fld>
             <a:endParaRPr lang="en-US" dirty="0"/>
           </a:p>
@@ -12931,7 +12931,7 @@
           <a:p>
             <a:fld id="{7E120F81-B39D-4CBB-8BF3-5D6E395D0F72}" type="datetimeFigureOut">
               <a:rPr lang="en-US" dirty="0"/>
-              <a:t>4/25/2018</a:t>
+              <a:t>4/26/2018</a:t>
             </a:fld>
             <a:endParaRPr lang="en-US" dirty="0"/>
           </a:p>
@@ -14041,7 +14041,7 @@
           <a:p>
             <a:fld id="{564B320A-89BA-47B2-A525-92E8D10B06E4}" type="datetimeFigureOut">
               <a:rPr lang="en-US" dirty="0"/>
-              <a:t>4/25/2018</a:t>
+              <a:t>4/26/2018</a:t>
             </a:fld>
             <a:endParaRPr lang="en-US" dirty="0"/>
           </a:p>

</xml_diff>

<commit_message>
slides added the presentation and test cases added
</commit_message>
<xml_diff>
--- a/Final Presentation/FYPFinalPresentation.pptx
+++ b/Final Presentation/FYPFinalPresentation.pptx
@@ -5,13 +5,15 @@
     <p:sldMasterId id="2147483648" r:id="rId1"/>
   </p:sldMasterIdLst>
   <p:notesMasterIdLst>
-    <p:notesMasterId r:id="rId6"/>
+    <p:notesMasterId r:id="rId8"/>
   </p:notesMasterIdLst>
   <p:sldIdLst>
     <p:sldId id="256" r:id="rId2"/>
     <p:sldId id="257" r:id="rId3"/>
     <p:sldId id="261" r:id="rId4"/>
     <p:sldId id="259" r:id="rId5"/>
+    <p:sldId id="262" r:id="rId6"/>
+    <p:sldId id="263" r:id="rId7"/>
   </p:sldIdLst>
   <p:sldSz cx="12192000" cy="6858000"/>
   <p:notesSz cx="6858000" cy="9144000"/>
@@ -200,7 +202,7 @@
           <a:p>
             <a:fld id="{55FF297E-CA1A-4BC9-A73D-BCACC3A6DC22}" type="datetimeFigureOut">
               <a:rPr lang="en-GB" smtClean="0"/>
-              <a:t>26/04/2018</a:t>
+              <a:t>27/04/2018</a:t>
             </a:fld>
             <a:endParaRPr lang="en-GB"/>
           </a:p>
@@ -1158,7 +1160,7 @@
             <a:fld id="{D200B3F0-A9BC-48CE-8EB6-ECE965069900}" type="datetimeFigureOut">
               <a:rPr lang="en-US" dirty="0"/>
               <a:pPr/>
-              <a:t>4/26/2018</a:t>
+              <a:t>4/27/2018</a:t>
             </a:fld>
             <a:endParaRPr lang="en-US" dirty="0"/>
           </a:p>
@@ -2319,7 +2321,7 @@
           <a:p>
             <a:fld id="{3DF9FFFF-3106-4DDB-AA62-0C80862170D6}" type="datetimeFigureOut">
               <a:rPr lang="en-US" dirty="0"/>
-              <a:t>4/26/2018</a:t>
+              <a:t>4/27/2018</a:t>
             </a:fld>
             <a:endParaRPr lang="en-US" dirty="0"/>
           </a:p>
@@ -3373,7 +3375,7 @@
           <a:p>
             <a:fld id="{A3DA38B7-AE95-4DC8-9A51-7A71F545B098}" type="datetimeFigureOut">
               <a:rPr lang="en-US" dirty="0"/>
-              <a:t>4/26/2018</a:t>
+              <a:t>4/27/2018</a:t>
             </a:fld>
             <a:endParaRPr lang="en-US" dirty="0"/>
           </a:p>
@@ -4586,7 +4588,7 @@
           <a:p>
             <a:fld id="{86F1EC2B-8188-4AC2-9F0D-8D09C51D505A}" type="datetimeFigureOut">
               <a:rPr lang="en-US" dirty="0"/>
-              <a:t>4/26/2018</a:t>
+              <a:t>4/27/2018</a:t>
             </a:fld>
             <a:endParaRPr lang="en-US" dirty="0"/>
           </a:p>
@@ -5690,7 +5692,7 @@
           <a:p>
             <a:fld id="{9212B75E-944F-430B-BE5F-C69FA8823C04}" type="datetimeFigureOut">
               <a:rPr lang="en-US" dirty="0"/>
-              <a:t>4/26/2018</a:t>
+              <a:t>4/27/2018</a:t>
             </a:fld>
             <a:endParaRPr lang="en-US" dirty="0"/>
           </a:p>
@@ -6342,7 +6344,7 @@
           <a:p>
             <a:fld id="{79AE0DC7-7F53-471C-A711-B3DA6F2535F3}" type="datetimeFigureOut">
               <a:rPr lang="en-US" dirty="0"/>
-              <a:t>4/26/2018</a:t>
+              <a:t>4/27/2018</a:t>
             </a:fld>
             <a:endParaRPr lang="en-US" dirty="0"/>
           </a:p>
@@ -7189,7 +7191,7 @@
           <a:p>
             <a:fld id="{3C1F4C9D-4618-451D-80C1-6A376BB42AB4}" type="datetimeFigureOut">
               <a:rPr lang="en-US" dirty="0"/>
-              <a:t>4/26/2018</a:t>
+              <a:t>4/27/2018</a:t>
             </a:fld>
             <a:endParaRPr lang="en-US" dirty="0"/>
           </a:p>
@@ -7374,7 +7376,7 @@
           <a:p>
             <a:fld id="{F54D2318-CE40-42F6-962A-4C6D6CF697DB}" type="datetimeFigureOut">
               <a:rPr lang="en-US" dirty="0"/>
-              <a:t>4/26/2018</a:t>
+              <a:t>4/27/2018</a:t>
             </a:fld>
             <a:endParaRPr lang="en-US" dirty="0"/>
           </a:p>
@@ -8415,7 +8417,7 @@
           <a:p>
             <a:fld id="{0C476AC1-EB7F-4BEF-90D9-5764B50DAF8A}" type="datetimeFigureOut">
               <a:rPr lang="en-US" dirty="0"/>
-              <a:t>4/26/2018</a:t>
+              <a:t>4/27/2018</a:t>
             </a:fld>
             <a:endParaRPr lang="en-US" dirty="0"/>
           </a:p>
@@ -8631,7 +8633,7 @@
           <a:p>
             <a:fld id="{1B20712A-F861-4AB0-A754-4F5A2033CD4B}" type="datetimeFigureOut">
               <a:rPr lang="en-US" dirty="0"/>
-              <a:t>4/26/2018</a:t>
+              <a:t>4/27/2018</a:t>
             </a:fld>
             <a:endParaRPr lang="en-US" dirty="0"/>
           </a:p>
@@ -9736,7 +9738,7 @@
           <a:p>
             <a:fld id="{324507B7-F2DC-4B2C-B14D-58A9766807A2}" type="datetimeFigureOut">
               <a:rPr lang="en-US" dirty="0"/>
-              <a:t>4/26/2018</a:t>
+              <a:t>4/27/2018</a:t>
             </a:fld>
             <a:endParaRPr lang="en-US" dirty="0"/>
           </a:p>
@@ -10008,7 +10010,7 @@
           <a:p>
             <a:fld id="{904A483D-5CB4-4842-8F2F-05D5276ACF63}" type="datetimeFigureOut">
               <a:rPr lang="en-US" dirty="0"/>
-              <a:t>4/26/2018</a:t>
+              <a:t>4/27/2018</a:t>
             </a:fld>
             <a:endParaRPr lang="en-US" dirty="0"/>
           </a:p>
@@ -10390,7 +10392,7 @@
           <a:p>
             <a:fld id="{1D1CE32E-9DC0-47C8-A657-48F5C3E4A10B}" type="datetimeFigureOut">
               <a:rPr lang="en-US" dirty="0"/>
-              <a:t>4/26/2018</a:t>
+              <a:t>4/27/2018</a:t>
             </a:fld>
             <a:endParaRPr lang="en-US" dirty="0"/>
           </a:p>
@@ -10508,7 +10510,7 @@
           <a:p>
             <a:fld id="{2BDF5C0D-8C3A-4771-A43D-83937FC700D4}" type="datetimeFigureOut">
               <a:rPr lang="en-US" dirty="0"/>
-              <a:t>4/26/2018</a:t>
+              <a:t>4/27/2018</a:t>
             </a:fld>
             <a:endParaRPr lang="en-US" dirty="0"/>
           </a:p>
@@ -10603,7 +10605,7 @@
           <a:p>
             <a:fld id="{0203D2D6-FCC2-425A-A4A7-8058E8C01CB1}" type="datetimeFigureOut">
               <a:rPr lang="en-US" dirty="0"/>
-              <a:t>4/26/2018</a:t>
+              <a:t>4/27/2018</a:t>
             </a:fld>
             <a:endParaRPr lang="en-US" dirty="0"/>
           </a:p>
@@ -11755,7 +11757,7 @@
           <a:p>
             <a:fld id="{D8CF2683-E6E7-4CC3-9EEE-7854DD4F3545}" type="datetimeFigureOut">
               <a:rPr lang="en-US" dirty="0"/>
-              <a:t>4/26/2018</a:t>
+              <a:t>4/27/2018</a:t>
             </a:fld>
             <a:endParaRPr lang="en-US" dirty="0"/>
           </a:p>
@@ -12931,7 +12933,7 @@
           <a:p>
             <a:fld id="{7E120F81-B39D-4CBB-8BF3-5D6E395D0F72}" type="datetimeFigureOut">
               <a:rPr lang="en-US" dirty="0"/>
-              <a:t>4/26/2018</a:t>
+              <a:t>4/27/2018</a:t>
             </a:fld>
             <a:endParaRPr lang="en-US" dirty="0"/>
           </a:p>
@@ -14041,7 +14043,7 @@
           <a:p>
             <a:fld id="{564B320A-89BA-47B2-A525-92E8D10B06E4}" type="datetimeFigureOut">
               <a:rPr lang="en-US" dirty="0"/>
-              <a:t>4/26/2018</a:t>
+              <a:t>4/27/2018</a:t>
             </a:fld>
             <a:endParaRPr lang="en-US" dirty="0"/>
           </a:p>
@@ -16861,6 +16863,609 @@
 </p:sld>
 </file>
 
+<file path=ppt/slides/slide5.xml><?xml version="1.0" encoding="utf-8"?>
+<p:sld xmlns:a="http://schemas.openxmlformats.org/drawingml/2006/main" xmlns:r="http://schemas.openxmlformats.org/officeDocument/2006/relationships" xmlns:p="http://schemas.openxmlformats.org/presentationml/2006/main" showMasterSp="0">
+  <p:cSld>
+    <p:bg>
+      <p:bgPr>
+        <a:solidFill>
+          <a:srgbClr val="912310"/>
+        </a:solidFill>
+        <a:effectLst/>
+      </p:bgPr>
+    </p:bg>
+    <p:spTree>
+      <p:nvGrpSpPr>
+        <p:cNvPr id="1" name=""/>
+        <p:cNvGrpSpPr/>
+        <p:nvPr/>
+      </p:nvGrpSpPr>
+      <p:grpSpPr>
+        <a:xfrm>
+          <a:off x="0" y="0"/>
+          <a:ext cx="0" cy="0"/>
+          <a:chOff x="0" y="0"/>
+          <a:chExt cx="0" cy="0"/>
+        </a:xfrm>
+      </p:grpSpPr>
+      <p:sp>
+        <p:nvSpPr>
+          <p:cNvPr id="53" name="TextBox 52">
+            <a:extLst>
+              <a:ext uri="{FF2B5EF4-FFF2-40B4-BE49-F238E27FC236}">
+                <a16:creationId xmlns:a16="http://schemas.microsoft.com/office/drawing/2014/main" id="{BFF6D01A-8990-45A2-A150-63B09F849A6C}"/>
+              </a:ext>
+            </a:extLst>
+          </p:cNvPr>
+          <p:cNvSpPr txBox="1"/>
+          <p:nvPr/>
+        </p:nvSpPr>
+        <p:spPr>
+          <a:xfrm>
+            <a:off x="2916505" y="74670"/>
+            <a:ext cx="5429250" cy="523220"/>
+          </a:xfrm>
+          <a:prstGeom prst="rect">
+            <a:avLst/>
+          </a:prstGeom>
+          <a:noFill/>
+        </p:spPr>
+        <p:txBody>
+          <a:bodyPr wrap="square" rtlCol="0">
+            <a:spAutoFit/>
+          </a:bodyPr>
+          <a:lstStyle/>
+          <a:p>
+            <a:pPr algn="ctr"/>
+            <a:r>
+              <a:rPr lang="en-IE" sz="2800" dirty="0">
+                <a:solidFill>
+                  <a:srgbClr val="FFFF00"/>
+                </a:solidFill>
+                <a:latin typeface="Rockwell Nova Extra Bold" panose="02060903020205020403" pitchFamily="18" charset="0"/>
+              </a:rPr>
+              <a:t>Testing</a:t>
+            </a:r>
+          </a:p>
+        </p:txBody>
+      </p:sp>
+      <p:pic>
+        <p:nvPicPr>
+          <p:cNvPr id="1026" name="Picture 2" descr="Image result for selenium icon">
+            <a:extLst>
+              <a:ext uri="{FF2B5EF4-FFF2-40B4-BE49-F238E27FC236}">
+                <a16:creationId xmlns:a16="http://schemas.microsoft.com/office/drawing/2014/main" id="{A3D4C570-8960-4D32-9899-3CF304093AD2}"/>
+              </a:ext>
+            </a:extLst>
+          </p:cNvPr>
+          <p:cNvPicPr>
+            <a:picLocks noChangeAspect="1" noChangeArrowheads="1"/>
+          </p:cNvPicPr>
+          <p:nvPr/>
+        </p:nvPicPr>
+        <p:blipFill>
+          <a:blip r:embed="rId2">
+            <a:extLst>
+              <a:ext uri="{28A0092B-C50C-407E-A947-70E740481C1C}">
+                <a14:useLocalDpi xmlns:a14="http://schemas.microsoft.com/office/drawing/2010/main" val="0"/>
+              </a:ext>
+            </a:extLst>
+          </a:blip>
+          <a:srcRect/>
+          <a:stretch>
+            <a:fillRect/>
+          </a:stretch>
+        </p:blipFill>
+        <p:spPr bwMode="auto">
+          <a:xfrm>
+            <a:off x="1412543" y="226356"/>
+            <a:ext cx="1951629" cy="1629739"/>
+          </a:xfrm>
+          <a:prstGeom prst="rect">
+            <a:avLst/>
+          </a:prstGeom>
+          <a:noFill/>
+          <a:extLst>
+            <a:ext uri="{909E8E84-426E-40DD-AFC4-6F175D3DCCD1}">
+              <a14:hiddenFill xmlns:a14="http://schemas.microsoft.com/office/drawing/2010/main">
+                <a:solidFill>
+                  <a:srgbClr val="FFFFFF"/>
+                </a:solidFill>
+              </a14:hiddenFill>
+            </a:ext>
+          </a:extLst>
+        </p:spPr>
+      </p:pic>
+      <p:sp>
+        <p:nvSpPr>
+          <p:cNvPr id="2" name="TextBox 1">
+            <a:extLst>
+              <a:ext uri="{FF2B5EF4-FFF2-40B4-BE49-F238E27FC236}">
+                <a16:creationId xmlns:a16="http://schemas.microsoft.com/office/drawing/2014/main" id="{860EE2A9-8471-44F0-A1D8-DA18EFFD374D}"/>
+              </a:ext>
+            </a:extLst>
+          </p:cNvPr>
+          <p:cNvSpPr txBox="1"/>
+          <p:nvPr/>
+        </p:nvSpPr>
+        <p:spPr>
+          <a:xfrm>
+            <a:off x="264099" y="2007781"/>
+            <a:ext cx="4607257" cy="2862322"/>
+          </a:xfrm>
+          <a:prstGeom prst="rect">
+            <a:avLst/>
+          </a:prstGeom>
+          <a:noFill/>
+        </p:spPr>
+        <p:txBody>
+          <a:bodyPr wrap="square" rtlCol="0">
+            <a:spAutoFit/>
+          </a:bodyPr>
+          <a:lstStyle/>
+          <a:p>
+            <a:r>
+              <a:rPr lang="en-GB" sz="2000" b="1" dirty="0">
+                <a:solidFill>
+                  <a:schemeClr val="bg1"/>
+                </a:solidFill>
+              </a:rPr>
+              <a:t>Browser Test cases done through the selenium</a:t>
+            </a:r>
+          </a:p>
+          <a:p>
+            <a:endParaRPr lang="en-GB" sz="2000" b="1" dirty="0">
+              <a:solidFill>
+                <a:schemeClr val="bg1"/>
+              </a:solidFill>
+            </a:endParaRPr>
+          </a:p>
+          <a:p>
+            <a:r>
+              <a:rPr lang="en-GB" sz="2000" b="1" dirty="0">
+                <a:solidFill>
+                  <a:schemeClr val="bg1"/>
+                </a:solidFill>
+              </a:rPr>
+              <a:t>Test cases included:</a:t>
+            </a:r>
+          </a:p>
+          <a:p>
+            <a:endParaRPr lang="en-GB" sz="2000" b="1" dirty="0">
+              <a:solidFill>
+                <a:schemeClr val="bg1"/>
+              </a:solidFill>
+            </a:endParaRPr>
+          </a:p>
+          <a:p>
+            <a:pPr marL="342900" indent="-342900">
+              <a:buFont typeface="Arial" panose="020B0604020202020204" pitchFamily="34" charset="0"/>
+              <a:buChar char="•"/>
+            </a:pPr>
+            <a:r>
+              <a:rPr lang="en-GB" sz="2000" b="1" dirty="0">
+                <a:solidFill>
+                  <a:schemeClr val="bg1"/>
+                </a:solidFill>
+              </a:rPr>
+              <a:t>Login test case.</a:t>
+            </a:r>
+          </a:p>
+          <a:p>
+            <a:pPr marL="342900" indent="-342900">
+              <a:buFont typeface="Arial" panose="020B0604020202020204" pitchFamily="34" charset="0"/>
+              <a:buChar char="•"/>
+            </a:pPr>
+            <a:r>
+              <a:rPr lang="en-GB" sz="2000" b="1" dirty="0">
+                <a:solidFill>
+                  <a:schemeClr val="bg1"/>
+                </a:solidFill>
+              </a:rPr>
+              <a:t>Register test case.</a:t>
+            </a:r>
+          </a:p>
+          <a:p>
+            <a:pPr marL="342900" indent="-342900">
+              <a:buFont typeface="Arial" panose="020B0604020202020204" pitchFamily="34" charset="0"/>
+              <a:buChar char="•"/>
+            </a:pPr>
+            <a:r>
+              <a:rPr lang="en-GB" sz="2000" b="1" dirty="0">
+                <a:solidFill>
+                  <a:schemeClr val="bg1"/>
+                </a:solidFill>
+              </a:rPr>
+              <a:t>Failed login test case.</a:t>
+            </a:r>
+          </a:p>
+          <a:p>
+            <a:pPr marL="342900" indent="-342900">
+              <a:buFont typeface="Arial" panose="020B0604020202020204" pitchFamily="34" charset="0"/>
+              <a:buChar char="•"/>
+            </a:pPr>
+            <a:r>
+              <a:rPr lang="en-GB" sz="2000" b="1" dirty="0">
+                <a:solidFill>
+                  <a:schemeClr val="bg1"/>
+                </a:solidFill>
+              </a:rPr>
+              <a:t>Menu page navigation test case</a:t>
+            </a:r>
+          </a:p>
+        </p:txBody>
+      </p:sp>
+      <p:sp>
+        <p:nvSpPr>
+          <p:cNvPr id="36" name="TextBox 35">
+            <a:extLst>
+              <a:ext uri="{FF2B5EF4-FFF2-40B4-BE49-F238E27FC236}">
+                <a16:creationId xmlns:a16="http://schemas.microsoft.com/office/drawing/2014/main" id="{67BA3541-C581-4D8F-B2ED-9929F23E2E08}"/>
+              </a:ext>
+            </a:extLst>
+          </p:cNvPr>
+          <p:cNvSpPr txBox="1"/>
+          <p:nvPr/>
+        </p:nvSpPr>
+        <p:spPr>
+          <a:xfrm>
+            <a:off x="6096000" y="1997839"/>
+            <a:ext cx="4607257" cy="2554545"/>
+          </a:xfrm>
+          <a:prstGeom prst="rect">
+            <a:avLst/>
+          </a:prstGeom>
+          <a:noFill/>
+        </p:spPr>
+        <p:txBody>
+          <a:bodyPr wrap="square" rtlCol="0">
+            <a:spAutoFit/>
+          </a:bodyPr>
+          <a:lstStyle/>
+          <a:p>
+            <a:r>
+              <a:rPr lang="en-GB" sz="2000" b="1" dirty="0">
+                <a:solidFill>
+                  <a:schemeClr val="bg1"/>
+                </a:solidFill>
+              </a:rPr>
+              <a:t>End user Testing</a:t>
+            </a:r>
+          </a:p>
+          <a:p>
+            <a:endParaRPr lang="en-GB" sz="2000" b="1" dirty="0">
+              <a:solidFill>
+                <a:schemeClr val="bg1"/>
+              </a:solidFill>
+            </a:endParaRPr>
+          </a:p>
+          <a:p>
+            <a:r>
+              <a:rPr lang="en-GB" sz="2000" b="1" dirty="0">
+                <a:solidFill>
+                  <a:schemeClr val="bg1"/>
+                </a:solidFill>
+              </a:rPr>
+              <a:t>Testing carried out by friends, family and peers. Taking note of the feed back and how they interacted with the application. Providing information and where improvements could be made </a:t>
+            </a:r>
+          </a:p>
+        </p:txBody>
+      </p:sp>
+    </p:spTree>
+    <p:extLst>
+      <p:ext uri="{BB962C8B-B14F-4D97-AF65-F5344CB8AC3E}">
+        <p14:creationId xmlns:p14="http://schemas.microsoft.com/office/powerpoint/2010/main" val="1899136964"/>
+      </p:ext>
+    </p:extLst>
+  </p:cSld>
+  <p:clrMapOvr>
+    <a:masterClrMapping/>
+  </p:clrMapOvr>
+</p:sld>
+</file>
+
+<file path=ppt/slides/slide6.xml><?xml version="1.0" encoding="utf-8"?>
+<p:sld xmlns:a="http://schemas.openxmlformats.org/drawingml/2006/main" xmlns:r="http://schemas.openxmlformats.org/officeDocument/2006/relationships" xmlns:p="http://schemas.openxmlformats.org/presentationml/2006/main" showMasterSp="0">
+  <p:cSld>
+    <p:bg>
+      <p:bgPr>
+        <a:solidFill>
+          <a:srgbClr val="912310"/>
+        </a:solidFill>
+        <a:effectLst/>
+      </p:bgPr>
+    </p:bg>
+    <p:spTree>
+      <p:nvGrpSpPr>
+        <p:cNvPr id="1" name=""/>
+        <p:cNvGrpSpPr/>
+        <p:nvPr/>
+      </p:nvGrpSpPr>
+      <p:grpSpPr>
+        <a:xfrm>
+          <a:off x="0" y="0"/>
+          <a:ext cx="0" cy="0"/>
+          <a:chOff x="0" y="0"/>
+          <a:chExt cx="0" cy="0"/>
+        </a:xfrm>
+      </p:grpSpPr>
+      <p:pic>
+        <p:nvPicPr>
+          <p:cNvPr id="4" name="Picture 3">
+            <a:extLst>
+              <a:ext uri="{FF2B5EF4-FFF2-40B4-BE49-F238E27FC236}">
+                <a16:creationId xmlns:a16="http://schemas.microsoft.com/office/drawing/2014/main" id="{FD542AB3-66E2-4C40-A8A1-4464D612E389}"/>
+              </a:ext>
+            </a:extLst>
+          </p:cNvPr>
+          <p:cNvPicPr>
+            <a:picLocks noChangeAspect="1"/>
+          </p:cNvPicPr>
+          <p:nvPr/>
+        </p:nvPicPr>
+        <p:blipFill>
+          <a:blip r:embed="rId2"/>
+          <a:stretch>
+            <a:fillRect/>
+          </a:stretch>
+        </p:blipFill>
+        <p:spPr>
+          <a:xfrm>
+            <a:off x="0" y="272144"/>
+            <a:ext cx="5491843" cy="3270787"/>
+          </a:xfrm>
+          <a:prstGeom prst="rect">
+            <a:avLst/>
+          </a:prstGeom>
+        </p:spPr>
+      </p:pic>
+      <p:pic>
+        <p:nvPicPr>
+          <p:cNvPr id="6" name="Picture 5">
+            <a:extLst>
+              <a:ext uri="{FF2B5EF4-FFF2-40B4-BE49-F238E27FC236}">
+                <a16:creationId xmlns:a16="http://schemas.microsoft.com/office/drawing/2014/main" id="{DCA74923-FAD3-4C90-B364-ADDA270D4299}"/>
+              </a:ext>
+            </a:extLst>
+          </p:cNvPr>
+          <p:cNvPicPr>
+            <a:picLocks noChangeAspect="1"/>
+          </p:cNvPicPr>
+          <p:nvPr/>
+        </p:nvPicPr>
+        <p:blipFill>
+          <a:blip r:embed="rId3"/>
+          <a:stretch>
+            <a:fillRect/>
+          </a:stretch>
+        </p:blipFill>
+        <p:spPr>
+          <a:xfrm>
+            <a:off x="5676899" y="272144"/>
+            <a:ext cx="6346809" cy="3270788"/>
+          </a:xfrm>
+          <a:prstGeom prst="rect">
+            <a:avLst/>
+          </a:prstGeom>
+        </p:spPr>
+      </p:pic>
+      <p:pic>
+        <p:nvPicPr>
+          <p:cNvPr id="8" name="Picture 7">
+            <a:extLst>
+              <a:ext uri="{FF2B5EF4-FFF2-40B4-BE49-F238E27FC236}">
+                <a16:creationId xmlns:a16="http://schemas.microsoft.com/office/drawing/2014/main" id="{081B2914-08BE-4A43-89BD-00B188858AC3}"/>
+              </a:ext>
+            </a:extLst>
+          </p:cNvPr>
+          <p:cNvPicPr>
+            <a:picLocks noChangeAspect="1"/>
+          </p:cNvPicPr>
+          <p:nvPr/>
+        </p:nvPicPr>
+        <p:blipFill>
+          <a:blip r:embed="rId4"/>
+          <a:stretch>
+            <a:fillRect/>
+          </a:stretch>
+        </p:blipFill>
+        <p:spPr>
+          <a:xfrm>
+            <a:off x="0" y="3792579"/>
+            <a:ext cx="5491843" cy="3010991"/>
+          </a:xfrm>
+          <a:prstGeom prst="rect">
+            <a:avLst/>
+          </a:prstGeom>
+        </p:spPr>
+      </p:pic>
+      <p:pic>
+        <p:nvPicPr>
+          <p:cNvPr id="10" name="Picture 9">
+            <a:extLst>
+              <a:ext uri="{FF2B5EF4-FFF2-40B4-BE49-F238E27FC236}">
+                <a16:creationId xmlns:a16="http://schemas.microsoft.com/office/drawing/2014/main" id="{CAD52300-D9D0-4EEC-A743-7942AA8CE518}"/>
+              </a:ext>
+            </a:extLst>
+          </p:cNvPr>
+          <p:cNvPicPr>
+            <a:picLocks noChangeAspect="1"/>
+          </p:cNvPicPr>
+          <p:nvPr/>
+        </p:nvPicPr>
+        <p:blipFill>
+          <a:blip r:embed="rId5"/>
+          <a:stretch>
+            <a:fillRect/>
+          </a:stretch>
+        </p:blipFill>
+        <p:spPr>
+          <a:xfrm>
+            <a:off x="5676899" y="3835723"/>
+            <a:ext cx="6303520" cy="3010991"/>
+          </a:xfrm>
+          <a:prstGeom prst="rect">
+            <a:avLst/>
+          </a:prstGeom>
+        </p:spPr>
+      </p:pic>
+      <p:sp>
+        <p:nvSpPr>
+          <p:cNvPr id="11" name="TextBox 10">
+            <a:extLst>
+              <a:ext uri="{FF2B5EF4-FFF2-40B4-BE49-F238E27FC236}">
+                <a16:creationId xmlns:a16="http://schemas.microsoft.com/office/drawing/2014/main" id="{D45FBE88-42DD-444A-9D6C-731B47D4DA78}"/>
+              </a:ext>
+            </a:extLst>
+          </p:cNvPr>
+          <p:cNvSpPr txBox="1"/>
+          <p:nvPr/>
+        </p:nvSpPr>
+        <p:spPr>
+          <a:xfrm>
+            <a:off x="979714" y="-37346"/>
+            <a:ext cx="2622834" cy="369332"/>
+          </a:xfrm>
+          <a:prstGeom prst="rect">
+            <a:avLst/>
+          </a:prstGeom>
+          <a:noFill/>
+        </p:spPr>
+        <p:txBody>
+          <a:bodyPr wrap="none" rtlCol="0">
+            <a:spAutoFit/>
+          </a:bodyPr>
+          <a:lstStyle/>
+          <a:p>
+            <a:r>
+              <a:rPr lang="en-GB" b="1" dirty="0"/>
+              <a:t>Menu Page Test Case</a:t>
+            </a:r>
+          </a:p>
+        </p:txBody>
+      </p:sp>
+      <p:sp>
+        <p:nvSpPr>
+          <p:cNvPr id="15" name="TextBox 14">
+            <a:extLst>
+              <a:ext uri="{FF2B5EF4-FFF2-40B4-BE49-F238E27FC236}">
+                <a16:creationId xmlns:a16="http://schemas.microsoft.com/office/drawing/2014/main" id="{5002356B-6ED1-4676-9C7C-5CF3E6194BD0}"/>
+              </a:ext>
+            </a:extLst>
+          </p:cNvPr>
+          <p:cNvSpPr txBox="1"/>
+          <p:nvPr/>
+        </p:nvSpPr>
+        <p:spPr>
+          <a:xfrm>
+            <a:off x="7086599" y="-37346"/>
+            <a:ext cx="1957587" cy="369332"/>
+          </a:xfrm>
+          <a:prstGeom prst="rect">
+            <a:avLst/>
+          </a:prstGeom>
+          <a:noFill/>
+        </p:spPr>
+        <p:txBody>
+          <a:bodyPr wrap="none" rtlCol="0">
+            <a:spAutoFit/>
+          </a:bodyPr>
+          <a:lstStyle/>
+          <a:p>
+            <a:r>
+              <a:rPr lang="en-GB" b="1" dirty="0"/>
+              <a:t>Login Test Case</a:t>
+            </a:r>
+          </a:p>
+        </p:txBody>
+      </p:sp>
+      <p:sp>
+        <p:nvSpPr>
+          <p:cNvPr id="16" name="TextBox 15">
+            <a:extLst>
+              <a:ext uri="{FF2B5EF4-FFF2-40B4-BE49-F238E27FC236}">
+                <a16:creationId xmlns:a16="http://schemas.microsoft.com/office/drawing/2014/main" id="{E3C26C06-5816-4734-B9C2-51F063E23747}"/>
+              </a:ext>
+            </a:extLst>
+          </p:cNvPr>
+          <p:cNvSpPr txBox="1"/>
+          <p:nvPr/>
+        </p:nvSpPr>
+        <p:spPr>
+          <a:xfrm>
+            <a:off x="970898" y="3466391"/>
+            <a:ext cx="2640466" cy="369332"/>
+          </a:xfrm>
+          <a:prstGeom prst="rect">
+            <a:avLst/>
+          </a:prstGeom>
+          <a:noFill/>
+        </p:spPr>
+        <p:txBody>
+          <a:bodyPr wrap="none" rtlCol="0">
+            <a:spAutoFit/>
+          </a:bodyPr>
+          <a:lstStyle/>
+          <a:p>
+            <a:r>
+              <a:rPr lang="en-GB" b="1" dirty="0"/>
+              <a:t>Failed Login Test Case</a:t>
+            </a:r>
+          </a:p>
+        </p:txBody>
+      </p:sp>
+      <p:sp>
+        <p:nvSpPr>
+          <p:cNvPr id="17" name="TextBox 16">
+            <a:extLst>
+              <a:ext uri="{FF2B5EF4-FFF2-40B4-BE49-F238E27FC236}">
+                <a16:creationId xmlns:a16="http://schemas.microsoft.com/office/drawing/2014/main" id="{7D404B83-9154-4414-BCD6-7E43DFBB9797}"/>
+              </a:ext>
+            </a:extLst>
+          </p:cNvPr>
+          <p:cNvSpPr txBox="1"/>
+          <p:nvPr/>
+        </p:nvSpPr>
+        <p:spPr>
+          <a:xfrm>
+            <a:off x="7173685" y="3515348"/>
+            <a:ext cx="2188420" cy="369332"/>
+          </a:xfrm>
+          <a:prstGeom prst="rect">
+            <a:avLst/>
+          </a:prstGeom>
+          <a:noFill/>
+        </p:spPr>
+        <p:txBody>
+          <a:bodyPr wrap="none" rtlCol="0">
+            <a:spAutoFit/>
+          </a:bodyPr>
+          <a:lstStyle/>
+          <a:p>
+            <a:r>
+              <a:rPr lang="en-GB" b="1"/>
+              <a:t>Register Test </a:t>
+            </a:r>
+            <a:r>
+              <a:rPr lang="en-GB" b="1" dirty="0"/>
+              <a:t>Case</a:t>
+            </a:r>
+          </a:p>
+        </p:txBody>
+      </p:sp>
+    </p:spTree>
+    <p:extLst>
+      <p:ext uri="{BB962C8B-B14F-4D97-AF65-F5344CB8AC3E}">
+        <p14:creationId xmlns:p14="http://schemas.microsoft.com/office/powerpoint/2010/main" val="988528936"/>
+      </p:ext>
+    </p:extLst>
+  </p:cSld>
+  <p:clrMapOvr>
+    <a:masterClrMapping/>
+  </p:clrMapOvr>
+</p:sld>
+</file>
+
 <file path=ppt/theme/theme1.xml><?xml version="1.0" encoding="utf-8"?>
 <a:theme xmlns:a="http://schemas.openxmlformats.org/drawingml/2006/main" name="Ion Boardroom">
   <a:themeElements>

</xml_diff>